<commit_message>
Updayed docs post AGU
</commit_message>
<xml_diff>
--- a/presentations/ES-DOC-AGU-2013-IN21D-The ES-DOC Project.pptx
+++ b/presentations/ES-DOC-AGU-2013-IN21D-The ES-DOC Project.pptx
@@ -5,10 +5,10 @@
     <p:sldMasterId id="2147483648" r:id="rId1"/>
   </p:sldMasterIdLst>
   <p:notesMasterIdLst>
-    <p:notesMasterId r:id="rId17"/>
+    <p:notesMasterId r:id="rId19"/>
   </p:notesMasterIdLst>
   <p:handoutMasterIdLst>
-    <p:handoutMasterId r:id="rId18"/>
+    <p:handoutMasterId r:id="rId20"/>
   </p:handoutMasterIdLst>
   <p:sldIdLst>
     <p:sldId id="290" r:id="rId2"/>
@@ -18,14 +18,16 @@
     <p:sldId id="274" r:id="rId6"/>
     <p:sldId id="275" r:id="rId7"/>
     <p:sldId id="276" r:id="rId8"/>
-    <p:sldId id="277" r:id="rId9"/>
-    <p:sldId id="291" r:id="rId10"/>
-    <p:sldId id="295" r:id="rId11"/>
-    <p:sldId id="292" r:id="rId12"/>
-    <p:sldId id="293" r:id="rId13"/>
-    <p:sldId id="294" r:id="rId14"/>
-    <p:sldId id="297" r:id="rId15"/>
-    <p:sldId id="296" r:id="rId16"/>
+    <p:sldId id="298" r:id="rId9"/>
+    <p:sldId id="299" r:id="rId10"/>
+    <p:sldId id="300" r:id="rId11"/>
+    <p:sldId id="295" r:id="rId12"/>
+    <p:sldId id="292" r:id="rId13"/>
+    <p:sldId id="305" r:id="rId14"/>
+    <p:sldId id="303" r:id="rId15"/>
+    <p:sldId id="304" r:id="rId16"/>
+    <p:sldId id="294" r:id="rId17"/>
+    <p:sldId id="301" r:id="rId18"/>
   </p:sldIdLst>
   <p:sldSz cx="9144000" cy="6858000" type="screen4x3"/>
   <p:notesSz cx="6858000" cy="9144000"/>
@@ -209,7 +211,7 @@
           <a:p>
             <a:fld id="{5E64D235-2B20-974A-A429-A9B3A83BF407}" type="datetimeFigureOut">
               <a:rPr lang="fr-FR" smtClean="0"/>
-              <a:t>09/12/2013</a:t>
+              <a:t>10/12/2013</a:t>
             </a:fld>
             <a:endParaRPr lang="en-GB"/>
           </a:p>
@@ -374,7 +376,7 @@
           <a:p>
             <a:fld id="{6DE4E904-B028-2A44-8D2D-3EFACCAFEE6C}" type="datetimeFigureOut">
               <a:rPr lang="fr-FR" smtClean="0"/>
-              <a:t>09/12/2013</a:t>
+              <a:t>10/12/2013</a:t>
             </a:fld>
             <a:endParaRPr lang="en-GB"/>
           </a:p>
@@ -823,7 +825,7 @@
           <a:p>
             <a:fld id="{1A1A7FA9-525B-7B4F-BDA6-45ADF3D586CB}" type="datetimeFigureOut">
               <a:rPr lang="fr-FR" smtClean="0"/>
-              <a:t>09/12/2013</a:t>
+              <a:t>10/12/2013</a:t>
             </a:fld>
             <a:endParaRPr lang="en-GB"/>
           </a:p>
@@ -993,7 +995,7 @@
           <a:p>
             <a:fld id="{1A1A7FA9-525B-7B4F-BDA6-45ADF3D586CB}" type="datetimeFigureOut">
               <a:rPr lang="fr-FR" smtClean="0"/>
-              <a:t>09/12/2013</a:t>
+              <a:t>10/12/2013</a:t>
             </a:fld>
             <a:endParaRPr lang="en-GB"/>
           </a:p>
@@ -1173,7 +1175,7 @@
           <a:p>
             <a:fld id="{1A1A7FA9-525B-7B4F-BDA6-45ADF3D586CB}" type="datetimeFigureOut">
               <a:rPr lang="fr-FR" smtClean="0"/>
-              <a:t>09/12/2013</a:t>
+              <a:t>10/12/2013</a:t>
             </a:fld>
             <a:endParaRPr lang="en-GB"/>
           </a:p>
@@ -1343,7 +1345,7 @@
           <a:p>
             <a:fld id="{1A1A7FA9-525B-7B4F-BDA6-45ADF3D586CB}" type="datetimeFigureOut">
               <a:rPr lang="fr-FR" smtClean="0"/>
-              <a:t>09/12/2013</a:t>
+              <a:t>10/12/2013</a:t>
             </a:fld>
             <a:endParaRPr lang="en-GB"/>
           </a:p>
@@ -1589,7 +1591,7 @@
           <a:p>
             <a:fld id="{1A1A7FA9-525B-7B4F-BDA6-45ADF3D586CB}" type="datetimeFigureOut">
               <a:rPr lang="fr-FR" smtClean="0"/>
-              <a:t>09/12/2013</a:t>
+              <a:t>10/12/2013</a:t>
             </a:fld>
             <a:endParaRPr lang="en-GB"/>
           </a:p>
@@ -1877,7 +1879,7 @@
           <a:p>
             <a:fld id="{1A1A7FA9-525B-7B4F-BDA6-45ADF3D586CB}" type="datetimeFigureOut">
               <a:rPr lang="fr-FR" smtClean="0"/>
-              <a:t>09/12/2013</a:t>
+              <a:t>10/12/2013</a:t>
             </a:fld>
             <a:endParaRPr lang="en-GB"/>
           </a:p>
@@ -2299,7 +2301,7 @@
           <a:p>
             <a:fld id="{1A1A7FA9-525B-7B4F-BDA6-45ADF3D586CB}" type="datetimeFigureOut">
               <a:rPr lang="fr-FR" smtClean="0"/>
-              <a:t>09/12/2013</a:t>
+              <a:t>10/12/2013</a:t>
             </a:fld>
             <a:endParaRPr lang="en-GB"/>
           </a:p>
@@ -2417,7 +2419,7 @@
           <a:p>
             <a:fld id="{1A1A7FA9-525B-7B4F-BDA6-45ADF3D586CB}" type="datetimeFigureOut">
               <a:rPr lang="fr-FR" smtClean="0"/>
-              <a:t>09/12/2013</a:t>
+              <a:t>10/12/2013</a:t>
             </a:fld>
             <a:endParaRPr lang="en-GB"/>
           </a:p>
@@ -2512,7 +2514,7 @@
           <a:p>
             <a:fld id="{1A1A7FA9-525B-7B4F-BDA6-45ADF3D586CB}" type="datetimeFigureOut">
               <a:rPr lang="fr-FR" smtClean="0"/>
-              <a:t>09/12/2013</a:t>
+              <a:t>10/12/2013</a:t>
             </a:fld>
             <a:endParaRPr lang="en-GB"/>
           </a:p>
@@ -2789,7 +2791,7 @@
           <a:p>
             <a:fld id="{1A1A7FA9-525B-7B4F-BDA6-45ADF3D586CB}" type="datetimeFigureOut">
               <a:rPr lang="fr-FR" smtClean="0"/>
-              <a:t>09/12/2013</a:t>
+              <a:t>10/12/2013</a:t>
             </a:fld>
             <a:endParaRPr lang="en-GB"/>
           </a:p>
@@ -3042,7 +3044,7 @@
           <a:p>
             <a:fld id="{1A1A7FA9-525B-7B4F-BDA6-45ADF3D586CB}" type="datetimeFigureOut">
               <a:rPr lang="fr-FR" smtClean="0"/>
-              <a:t>09/12/2013</a:t>
+              <a:t>10/12/2013</a:t>
             </a:fld>
             <a:endParaRPr lang="en-GB"/>
           </a:p>
@@ -3255,7 +3257,7 @@
           <a:p>
             <a:fld id="{1A1A7FA9-525B-7B4F-BDA6-45ADF3D586CB}" type="datetimeFigureOut">
               <a:rPr lang="fr-FR" smtClean="0"/>
-              <a:t>09/12/2013</a:t>
+              <a:t>10/12/2013</a:t>
             </a:fld>
             <a:endParaRPr lang="en-GB"/>
           </a:p>
@@ -3735,7 +3737,7 @@
           <a:p>
             <a:r>
               <a:rPr lang="en-GB" sz="6600" b="1" dirty="0" smtClean="0"/>
-              <a:t>Process</a:t>
+              <a:t>Strategic Relevance</a:t>
             </a:r>
             <a:endParaRPr lang="en-GB" sz="6600" b="1" dirty="0"/>
           </a:p>
@@ -3779,8 +3781,8 @@
         </p:nvSpPr>
         <p:spPr>
           <a:xfrm>
-            <a:off x="1" y="2168652"/>
-            <a:ext cx="9143999" cy="2862322"/>
+            <a:off x="1" y="2443244"/>
+            <a:ext cx="9143999" cy="1446550"/>
           </a:xfrm>
           <a:prstGeom prst="rect">
             <a:avLst/>
@@ -3795,37 +3797,8 @@
           <a:p>
             <a:pPr algn="ctr"/>
             <a:r>
-              <a:rPr lang="en-GB" sz="3600" dirty="0" smtClean="0"/>
-              <a:t>Transparent</a:t>
-            </a:r>
-            <a:endParaRPr lang="en-GB" sz="3600" dirty="0" smtClean="0"/>
-          </a:p>
-          <a:p>
-            <a:pPr algn="ctr"/>
-            <a:r>
-              <a:rPr lang="en-GB" sz="3600" dirty="0" smtClean="0"/>
-              <a:t>Documented</a:t>
-            </a:r>
-          </a:p>
-          <a:p>
-            <a:pPr algn="ctr"/>
-            <a:r>
-              <a:rPr lang="en-GB" sz="3600" dirty="0" smtClean="0"/>
-              <a:t>Iterative</a:t>
-            </a:r>
-          </a:p>
-          <a:p>
-            <a:pPr algn="ctr"/>
-            <a:r>
-              <a:rPr lang="en-GB" sz="3600" dirty="0" smtClean="0"/>
-              <a:t>Sustainable</a:t>
-            </a:r>
-          </a:p>
-          <a:p>
-            <a:pPr algn="ctr"/>
-            <a:r>
-              <a:rPr lang="en-GB" sz="3600" dirty="0" smtClean="0"/>
-              <a:t>International</a:t>
+              <a:rPr lang="en-GB" sz="4400" dirty="0" smtClean="0"/>
+              <a:t>EXA-Scale requires quality documentation</a:t>
             </a:r>
           </a:p>
         </p:txBody>
@@ -3833,7 +3806,7 @@
     </p:spTree>
     <p:extLst>
       <p:ext uri="{BB962C8B-B14F-4D97-AF65-F5344CB8AC3E}">
-        <p14:creationId xmlns:p14="http://schemas.microsoft.com/office/powerpoint/2010/main" val="2196942164"/>
+        <p14:creationId xmlns:p14="http://schemas.microsoft.com/office/powerpoint/2010/main" val="4103372153"/>
       </p:ext>
     </p:extLst>
   </p:cSld>
@@ -3889,7 +3862,7 @@
           <a:p>
             <a:r>
               <a:rPr lang="en-GB" sz="6600" b="1" dirty="0" smtClean="0"/>
-              <a:t>Services</a:t>
+              <a:t>Process</a:t>
             </a:r>
             <a:endParaRPr lang="en-GB" sz="6600" b="1" dirty="0"/>
           </a:p>
@@ -3933,8 +3906,8 @@
         </p:nvSpPr>
         <p:spPr>
           <a:xfrm>
-            <a:off x="1" y="2142375"/>
-            <a:ext cx="9143999" cy="3416320"/>
+            <a:off x="1" y="2168652"/>
+            <a:ext cx="9143999" cy="2862322"/>
           </a:xfrm>
           <a:prstGeom prst="rect">
             <a:avLst/>
@@ -3950,42 +3923,35 @@
             <a:pPr algn="ctr"/>
             <a:r>
               <a:rPr lang="en-GB" sz="3600" dirty="0" smtClean="0"/>
-              <a:t>Engage scientific community</a:t>
+              <a:t>Transparent</a:t>
             </a:r>
           </a:p>
           <a:p>
             <a:pPr algn="ctr"/>
             <a:r>
               <a:rPr lang="en-GB" sz="3600" dirty="0" smtClean="0"/>
-              <a:t>Nurture standards, e.g. CIM</a:t>
+              <a:t>Documented</a:t>
             </a:r>
           </a:p>
           <a:p>
             <a:pPr algn="ctr"/>
             <a:r>
               <a:rPr lang="en-GB" sz="3600" dirty="0" smtClean="0"/>
-              <a:t>Advocacy</a:t>
+              <a:t>Iterative</a:t>
             </a:r>
           </a:p>
           <a:p>
             <a:pPr algn="ctr"/>
             <a:r>
               <a:rPr lang="en-GB" sz="3600" dirty="0" smtClean="0"/>
-              <a:t>Governance</a:t>
+              <a:t>Sustainable</a:t>
             </a:r>
           </a:p>
           <a:p>
             <a:pPr algn="ctr"/>
             <a:r>
               <a:rPr lang="en-GB" sz="3600" dirty="0" smtClean="0"/>
-              <a:t>Dissemination</a:t>
-            </a:r>
-          </a:p>
-          <a:p>
-            <a:pPr algn="ctr"/>
-            <a:r>
-              <a:rPr lang="en-GB" sz="3600" dirty="0" smtClean="0"/>
-              <a:t>Exploitation</a:t>
+              <a:t>International</a:t>
             </a:r>
           </a:p>
         </p:txBody>
@@ -3993,7 +3959,7 @@
     </p:spTree>
     <p:extLst>
       <p:ext uri="{BB962C8B-B14F-4D97-AF65-F5344CB8AC3E}">
-        <p14:creationId xmlns:p14="http://schemas.microsoft.com/office/powerpoint/2010/main" val="1329324055"/>
+        <p14:creationId xmlns:p14="http://schemas.microsoft.com/office/powerpoint/2010/main" val="2196942164"/>
       </p:ext>
     </p:extLst>
   </p:cSld>
@@ -4049,7 +4015,7 @@
           <a:p>
             <a:r>
               <a:rPr lang="en-GB" sz="6600" b="1" dirty="0" smtClean="0"/>
-              <a:t>Tools</a:t>
+              <a:t>Services</a:t>
             </a:r>
             <a:endParaRPr lang="en-GB" sz="6600" b="1" dirty="0"/>
           </a:p>
@@ -4093,8 +4059,8 @@
         </p:nvSpPr>
         <p:spPr>
           <a:xfrm>
-            <a:off x="1" y="2048518"/>
-            <a:ext cx="9143999" cy="2862322"/>
+            <a:off x="1" y="2142375"/>
+            <a:ext cx="9143999" cy="3416320"/>
           </a:xfrm>
           <a:prstGeom prst="rect">
             <a:avLst/>
@@ -4110,35 +4076,42 @@
             <a:pPr algn="ctr"/>
             <a:r>
               <a:rPr lang="en-GB" sz="3600" dirty="0" smtClean="0"/>
-              <a:t>Create</a:t>
+              <a:t>Engage scientific community</a:t>
             </a:r>
           </a:p>
           <a:p>
             <a:pPr algn="ctr"/>
             <a:r>
               <a:rPr lang="en-GB" sz="3600" dirty="0" smtClean="0"/>
-              <a:t>Search</a:t>
+              <a:t>Nurture standards, e.g. CIM</a:t>
             </a:r>
           </a:p>
           <a:p>
             <a:pPr algn="ctr"/>
             <a:r>
               <a:rPr lang="en-GB" sz="3600" dirty="0" smtClean="0"/>
-              <a:t>View</a:t>
+              <a:t>Advocacy</a:t>
             </a:r>
           </a:p>
           <a:p>
             <a:pPr algn="ctr"/>
             <a:r>
               <a:rPr lang="en-GB" sz="3600" dirty="0" smtClean="0"/>
-              <a:t>Compare</a:t>
+              <a:t>Governance</a:t>
             </a:r>
           </a:p>
           <a:p>
             <a:pPr algn="ctr"/>
             <a:r>
               <a:rPr lang="en-GB" sz="3600" dirty="0" smtClean="0"/>
-              <a:t>Visualize</a:t>
+              <a:t>Dissemination</a:t>
+            </a:r>
+          </a:p>
+          <a:p>
+            <a:pPr algn="ctr"/>
+            <a:r>
+              <a:rPr lang="en-GB" sz="3600" dirty="0" smtClean="0"/>
+              <a:t>Exploitation</a:t>
             </a:r>
           </a:p>
         </p:txBody>
@@ -4146,7 +4119,7 @@
     </p:spTree>
     <p:extLst>
       <p:ext uri="{BB962C8B-B14F-4D97-AF65-F5344CB8AC3E}">
-        <p14:creationId xmlns:p14="http://schemas.microsoft.com/office/powerpoint/2010/main" val="3721793522"/>
+        <p14:creationId xmlns:p14="http://schemas.microsoft.com/office/powerpoint/2010/main" val="1329324055"/>
       </p:ext>
     </p:extLst>
   </p:cSld>
@@ -4202,7 +4175,7 @@
           <a:p>
             <a:r>
               <a:rPr lang="en-GB" sz="6600" b="1" dirty="0" smtClean="0"/>
-              <a:t>API</a:t>
+              <a:t>Tools</a:t>
             </a:r>
             <a:endParaRPr lang="en-GB" sz="6600" b="1" dirty="0"/>
           </a:p>
@@ -4246,8 +4219,8 @@
         </p:nvSpPr>
         <p:spPr>
           <a:xfrm>
-            <a:off x="1" y="2168652"/>
-            <a:ext cx="9143999" cy="2308324"/>
+            <a:off x="1" y="2048518"/>
+            <a:ext cx="9143999" cy="2862322"/>
           </a:xfrm>
           <a:prstGeom prst="rect">
             <a:avLst/>
@@ -4263,7 +4236,7 @@
             <a:pPr algn="ctr"/>
             <a:r>
               <a:rPr lang="en-GB" sz="3600" dirty="0" smtClean="0"/>
-              <a:t>Publish</a:t>
+              <a:t>Create</a:t>
             </a:r>
           </a:p>
           <a:p>
@@ -4271,6 +4244,13 @@
             <a:r>
               <a:rPr lang="en-GB" sz="3600" dirty="0" smtClean="0"/>
               <a:t>Search</a:t>
+            </a:r>
+          </a:p>
+          <a:p>
+            <a:pPr algn="ctr"/>
+            <a:r>
+              <a:rPr lang="en-GB" sz="3600" dirty="0" smtClean="0"/>
+              <a:t>View</a:t>
             </a:r>
           </a:p>
           <a:p>
@@ -4292,7 +4272,7 @@
     </p:spTree>
     <p:extLst>
       <p:ext uri="{BB962C8B-B14F-4D97-AF65-F5344CB8AC3E}">
-        <p14:creationId xmlns:p14="http://schemas.microsoft.com/office/powerpoint/2010/main" val="2175938869"/>
+        <p14:creationId xmlns:p14="http://schemas.microsoft.com/office/powerpoint/2010/main" val="4289923452"/>
       </p:ext>
     </p:extLst>
   </p:cSld>
@@ -4326,37 +4306,9 @@
           <a:chExt cx="0" cy="0"/>
         </a:xfrm>
       </p:grpSpPr>
-      <p:sp>
-        <p:nvSpPr>
-          <p:cNvPr id="2" name="Titre 1"/>
-          <p:cNvSpPr>
-            <a:spLocks noGrp="1"/>
-          </p:cNvSpPr>
-          <p:nvPr>
-            <p:ph type="title"/>
-          </p:nvPr>
-        </p:nvSpPr>
-        <p:spPr>
-          <a:xfrm>
-            <a:off x="457200" y="489163"/>
-            <a:ext cx="8229600" cy="1143000"/>
-          </a:xfrm>
-        </p:spPr>
-        <p:txBody>
-          <a:bodyPr/>
-          <a:lstStyle/>
-          <a:p>
-            <a:r>
-              <a:rPr lang="en-GB" sz="6600" b="1" dirty="0" smtClean="0"/>
-              <a:t>Online Presence</a:t>
-            </a:r>
-            <a:endParaRPr lang="en-GB" sz="6600" b="1" dirty="0"/>
-          </a:p>
-        </p:txBody>
-      </p:sp>
       <p:pic>
         <p:nvPicPr>
-          <p:cNvPr id="3" name="Image 2" descr="es-doc-logo.png"/>
+          <p:cNvPr id="7" name="Image 6" descr="agu-search.png"/>
           <p:cNvPicPr>
             <a:picLocks noChangeAspect="1"/>
           </p:cNvPicPr>
@@ -4376,70 +4328,18 @@
         </p:blipFill>
         <p:spPr>
           <a:xfrm>
-            <a:off x="6358431" y="5962278"/>
-            <a:ext cx="2592253" cy="653902"/>
+            <a:off x="965200" y="0"/>
+            <a:ext cx="7207680" cy="6858000"/>
           </a:xfrm>
           <a:prstGeom prst="rect">
             <a:avLst/>
           </a:prstGeom>
         </p:spPr>
       </p:pic>
-      <p:sp>
-        <p:nvSpPr>
-          <p:cNvPr id="4" name="ZoneTexte 3"/>
-          <p:cNvSpPr txBox="1"/>
-          <p:nvPr/>
-        </p:nvSpPr>
-        <p:spPr>
-          <a:xfrm>
-            <a:off x="1" y="2297367"/>
-            <a:ext cx="9143999" cy="2800767"/>
-          </a:xfrm>
-          <a:prstGeom prst="rect">
-            <a:avLst/>
-          </a:prstGeom>
-          <a:noFill/>
-        </p:spPr>
-        <p:txBody>
-          <a:bodyPr wrap="square" rtlCol="0">
-            <a:spAutoFit/>
-          </a:bodyPr>
-          <a:lstStyle/>
-          <a:p>
-            <a:pPr algn="ctr"/>
-            <a:r>
-              <a:rPr lang="en-GB" sz="4400" dirty="0" smtClean="0"/>
-              <a:t>Splash Page</a:t>
-            </a:r>
-          </a:p>
-          <a:p>
-            <a:pPr algn="ctr"/>
-            <a:r>
-              <a:rPr lang="en-GB" sz="4400" dirty="0" smtClean="0"/>
-              <a:t>Quick Links</a:t>
-            </a:r>
-          </a:p>
-          <a:p>
-            <a:pPr algn="ctr"/>
-            <a:r>
-              <a:rPr lang="en-GB" sz="4400" dirty="0" smtClean="0"/>
-              <a:t>Tools</a:t>
-            </a:r>
-          </a:p>
-          <a:p>
-            <a:pPr algn="ctr"/>
-            <a:r>
-              <a:rPr lang="en-GB" sz="4400" dirty="0" smtClean="0"/>
-              <a:t>API</a:t>
-            </a:r>
-            <a:endParaRPr lang="en-GB" sz="4400" dirty="0" smtClean="0"/>
-          </a:p>
-        </p:txBody>
-      </p:sp>
     </p:spTree>
     <p:extLst>
       <p:ext uri="{BB962C8B-B14F-4D97-AF65-F5344CB8AC3E}">
-        <p14:creationId xmlns:p14="http://schemas.microsoft.com/office/powerpoint/2010/main" val="2080584398"/>
+        <p14:creationId xmlns:p14="http://schemas.microsoft.com/office/powerpoint/2010/main" val="2844965162"/>
       </p:ext>
     </p:extLst>
   </p:cSld>
@@ -4473,6 +4373,73 @@
           <a:chExt cx="0" cy="0"/>
         </a:xfrm>
       </p:grpSpPr>
+      <p:pic>
+        <p:nvPicPr>
+          <p:cNvPr id="2" name="Image 1" descr="agu-compare.png"/>
+          <p:cNvPicPr>
+            <a:picLocks noChangeAspect="1"/>
+          </p:cNvPicPr>
+          <p:nvPr/>
+        </p:nvPicPr>
+        <p:blipFill>
+          <a:blip r:embed="rId2">
+            <a:extLst>
+              <a:ext uri="{28A0092B-C50C-407E-A947-70E740481C1C}">
+                <a14:useLocalDpi xmlns:a14="http://schemas.microsoft.com/office/drawing/2010/main" val="0"/>
+              </a:ext>
+            </a:extLst>
+          </a:blip>
+          <a:stretch>
+            <a:fillRect/>
+          </a:stretch>
+        </p:blipFill>
+        <p:spPr>
+          <a:xfrm>
+            <a:off x="38100" y="0"/>
+            <a:ext cx="9053547" cy="6858000"/>
+          </a:xfrm>
+          <a:prstGeom prst="rect">
+            <a:avLst/>
+          </a:prstGeom>
+        </p:spPr>
+      </p:pic>
+    </p:spTree>
+    <p:extLst>
+      <p:ext uri="{BB962C8B-B14F-4D97-AF65-F5344CB8AC3E}">
+        <p14:creationId xmlns:p14="http://schemas.microsoft.com/office/powerpoint/2010/main" val="2940265579"/>
+      </p:ext>
+    </p:extLst>
+  </p:cSld>
+  <p:clrMapOvr>
+    <a:masterClrMapping/>
+  </p:clrMapOvr>
+  <p:timing>
+    <p:tnLst>
+      <p:par>
+        <p:cTn xmlns:p14="http://schemas.microsoft.com/office/powerpoint/2010/main" id="1" dur="indefinite" restart="never" nodeType="tmRoot"/>
+      </p:par>
+    </p:tnLst>
+  </p:timing>
+</p:sld>
+</file>
+
+<file path=ppt/slides/slide16.xml><?xml version="1.0" encoding="utf-8"?>
+<p:sld xmlns:a="http://schemas.openxmlformats.org/drawingml/2006/main" xmlns:r="http://schemas.openxmlformats.org/officeDocument/2006/relationships" xmlns:p="http://schemas.openxmlformats.org/presentationml/2006/main">
+  <p:cSld>
+    <p:spTree>
+      <p:nvGrpSpPr>
+        <p:cNvPr id="1" name=""/>
+        <p:cNvGrpSpPr/>
+        <p:nvPr/>
+      </p:nvGrpSpPr>
+      <p:grpSpPr>
+        <a:xfrm>
+          <a:off x="0" y="0"/>
+          <a:ext cx="0" cy="0"/>
+          <a:chOff x="0" y="0"/>
+          <a:chExt cx="0" cy="0"/>
+        </a:xfrm>
+      </p:grpSpPr>
       <p:sp>
         <p:nvSpPr>
           <p:cNvPr id="2" name="Titre 1"/>
@@ -4495,7 +4462,7 @@
           <a:p>
             <a:r>
               <a:rPr lang="en-GB" sz="6600" b="1" dirty="0" smtClean="0"/>
-              <a:t>Demo</a:t>
+              <a:t>API</a:t>
             </a:r>
             <a:endParaRPr lang="en-GB" sz="6600" b="1" dirty="0"/>
           </a:p>
@@ -4539,7 +4506,7 @@
         </p:nvSpPr>
         <p:spPr>
           <a:xfrm>
-            <a:off x="1" y="2168652"/>
+            <a:off x="1" y="2237300"/>
             <a:ext cx="9143999" cy="2308324"/>
           </a:xfrm>
           <a:prstGeom prst="rect">
@@ -4556,14 +4523,14 @@
             <a:pPr algn="ctr"/>
             <a:r>
               <a:rPr lang="en-GB" sz="3600" dirty="0" smtClean="0"/>
+              <a:t>Publish</a:t>
+            </a:r>
+          </a:p>
+          <a:p>
+            <a:pPr algn="ctr"/>
+            <a:r>
+              <a:rPr lang="en-GB" sz="3600" dirty="0" smtClean="0"/>
               <a:t>Search</a:t>
-            </a:r>
-          </a:p>
-          <a:p>
-            <a:pPr algn="ctr"/>
-            <a:r>
-              <a:rPr lang="en-GB" sz="3600" dirty="0" smtClean="0"/>
-              <a:t>View</a:t>
             </a:r>
           </a:p>
           <a:p>
@@ -4577,16 +4544,165 @@
             <a:pPr algn="ctr"/>
             <a:r>
               <a:rPr lang="en-GB" sz="3600" dirty="0" smtClean="0"/>
-              <a:t>Publish</a:t>
-            </a:r>
-            <a:endParaRPr lang="en-GB" sz="3600" dirty="0" smtClean="0"/>
+              <a:t>Visualize</a:t>
+            </a:r>
           </a:p>
         </p:txBody>
       </p:sp>
     </p:spTree>
     <p:extLst>
       <p:ext uri="{BB962C8B-B14F-4D97-AF65-F5344CB8AC3E}">
-        <p14:creationId xmlns:p14="http://schemas.microsoft.com/office/powerpoint/2010/main" val="3447186999"/>
+        <p14:creationId xmlns:p14="http://schemas.microsoft.com/office/powerpoint/2010/main" val="2175938869"/>
+      </p:ext>
+    </p:extLst>
+  </p:cSld>
+  <p:clrMapOvr>
+    <a:masterClrMapping/>
+  </p:clrMapOvr>
+  <p:timing>
+    <p:tnLst>
+      <p:par>
+        <p:cTn xmlns:p14="http://schemas.microsoft.com/office/powerpoint/2010/main" id="1" dur="indefinite" restart="never" nodeType="tmRoot"/>
+      </p:par>
+    </p:tnLst>
+  </p:timing>
+</p:sld>
+</file>
+
+<file path=ppt/slides/slide17.xml><?xml version="1.0" encoding="utf-8"?>
+<p:sld xmlns:a="http://schemas.openxmlformats.org/drawingml/2006/main" xmlns:r="http://schemas.openxmlformats.org/officeDocument/2006/relationships" xmlns:p="http://schemas.openxmlformats.org/presentationml/2006/main">
+  <p:cSld>
+    <p:spTree>
+      <p:nvGrpSpPr>
+        <p:cNvPr id="1" name=""/>
+        <p:cNvGrpSpPr/>
+        <p:nvPr/>
+      </p:nvGrpSpPr>
+      <p:grpSpPr>
+        <a:xfrm>
+          <a:off x="0" y="0"/>
+          <a:ext cx="0" cy="0"/>
+          <a:chOff x="0" y="0"/>
+          <a:chExt cx="0" cy="0"/>
+        </a:xfrm>
+      </p:grpSpPr>
+      <p:sp>
+        <p:nvSpPr>
+          <p:cNvPr id="2" name="Titre 1"/>
+          <p:cNvSpPr>
+            <a:spLocks noGrp="1"/>
+          </p:cNvSpPr>
+          <p:nvPr>
+            <p:ph type="title"/>
+          </p:nvPr>
+        </p:nvSpPr>
+        <p:spPr>
+          <a:xfrm>
+            <a:off x="457200" y="489163"/>
+            <a:ext cx="8229600" cy="1143000"/>
+          </a:xfrm>
+        </p:spPr>
+        <p:txBody>
+          <a:bodyPr/>
+          <a:lstStyle/>
+          <a:p>
+            <a:r>
+              <a:rPr lang="en-GB" sz="6600" b="1" dirty="0"/>
+              <a:t>Publishing API Client</a:t>
+            </a:r>
+            <a:endParaRPr lang="en-GB" sz="6600" b="1" dirty="0"/>
+          </a:p>
+        </p:txBody>
+      </p:sp>
+      <p:pic>
+        <p:nvPicPr>
+          <p:cNvPr id="3" name="Image 2" descr="es-doc-logo.png"/>
+          <p:cNvPicPr>
+            <a:picLocks noChangeAspect="1"/>
+          </p:cNvPicPr>
+          <p:nvPr/>
+        </p:nvPicPr>
+        <p:blipFill>
+          <a:blip r:embed="rId2">
+            <a:extLst>
+              <a:ext uri="{28A0092B-C50C-407E-A947-70E740481C1C}">
+                <a14:useLocalDpi xmlns:a14="http://schemas.microsoft.com/office/drawing/2010/main" val="0"/>
+              </a:ext>
+            </a:extLst>
+          </a:blip>
+          <a:stretch>
+            <a:fillRect/>
+          </a:stretch>
+        </p:blipFill>
+        <p:spPr>
+          <a:xfrm>
+            <a:off x="6358431" y="5962278"/>
+            <a:ext cx="2592253" cy="653902"/>
+          </a:xfrm>
+          <a:prstGeom prst="rect">
+            <a:avLst/>
+          </a:prstGeom>
+        </p:spPr>
+      </p:pic>
+      <p:sp>
+        <p:nvSpPr>
+          <p:cNvPr id="4" name="ZoneTexte 3"/>
+          <p:cNvSpPr txBox="1"/>
+          <p:nvPr/>
+        </p:nvSpPr>
+        <p:spPr>
+          <a:xfrm>
+            <a:off x="1" y="2237300"/>
+            <a:ext cx="9143999" cy="2862322"/>
+          </a:xfrm>
+          <a:prstGeom prst="rect">
+            <a:avLst/>
+          </a:prstGeom>
+          <a:noFill/>
+        </p:spPr>
+        <p:txBody>
+          <a:bodyPr wrap="square" rtlCol="0">
+            <a:spAutoFit/>
+          </a:bodyPr>
+          <a:lstStyle/>
+          <a:p>
+            <a:pPr algn="ctr"/>
+            <a:r>
+              <a:rPr lang="en-GB" sz="3600" b="1" dirty="0" smtClean="0"/>
+              <a:t>2013</a:t>
+            </a:r>
+          </a:p>
+          <a:p>
+            <a:pPr algn="ctr"/>
+            <a:r>
+              <a:rPr lang="en-GB" sz="3600" dirty="0" smtClean="0"/>
+              <a:t>Python</a:t>
+            </a:r>
+          </a:p>
+          <a:p>
+            <a:pPr algn="ctr"/>
+            <a:endParaRPr lang="en-GB" sz="3600" dirty="0" smtClean="0"/>
+          </a:p>
+          <a:p>
+            <a:pPr algn="ctr"/>
+            <a:r>
+              <a:rPr lang="en-GB" sz="3600" b="1" dirty="0" smtClean="0"/>
+              <a:t>2014</a:t>
+            </a:r>
+          </a:p>
+          <a:p>
+            <a:pPr algn="ctr"/>
+            <a:r>
+              <a:rPr lang="en-GB" sz="3600" dirty="0" smtClean="0"/>
+              <a:t>C, Java</a:t>
+            </a:r>
+          </a:p>
+        </p:txBody>
+      </p:sp>
+    </p:spTree>
+    <p:extLst>
+      <p:ext uri="{BB962C8B-B14F-4D97-AF65-F5344CB8AC3E}">
+        <p14:creationId xmlns:p14="http://schemas.microsoft.com/office/powerpoint/2010/main" val="3315272670"/>
       </p:ext>
     </p:extLst>
   </p:cSld>
@@ -5018,11 +5134,7 @@
             <a:pPr algn="ctr"/>
             <a:r>
               <a:rPr lang="en-GB" sz="4800" dirty="0" smtClean="0"/>
-              <a:t>EX-ARCH (G8</a:t>
-            </a:r>
-            <a:r>
-              <a:rPr lang="en-GB" sz="4800" dirty="0" smtClean="0"/>
-              <a:t>)</a:t>
+              <a:t>EX-ARCH (G8)</a:t>
             </a:r>
           </a:p>
           <a:p>
@@ -5031,7 +5143,6 @@
               <a:rPr lang="en-GB" sz="4800" dirty="0" smtClean="0"/>
               <a:t>ISENES-2 (EU)</a:t>
             </a:r>
-            <a:endParaRPr lang="en-GB" sz="4800" dirty="0" smtClean="0"/>
           </a:p>
         </p:txBody>
       </p:sp>
@@ -5489,7 +5600,7 @@
         </p:nvSpPr>
         <p:spPr>
           <a:xfrm>
-            <a:off x="1" y="2297367"/>
+            <a:off x="1" y="2263043"/>
             <a:ext cx="9143999" cy="3046988"/>
           </a:xfrm>
           <a:prstGeom prst="rect">
@@ -5514,7 +5625,7 @@
     </p:spTree>
     <p:extLst>
       <p:ext uri="{BB962C8B-B14F-4D97-AF65-F5344CB8AC3E}">
-        <p14:creationId xmlns:p14="http://schemas.microsoft.com/office/powerpoint/2010/main" val="2847720813"/>
+        <p14:creationId xmlns:p14="http://schemas.microsoft.com/office/powerpoint/2010/main" val="2147464032"/>
       </p:ext>
     </p:extLst>
   </p:cSld>
@@ -5570,7 +5681,7 @@
           <a:p>
             <a:r>
               <a:rPr lang="en-GB" sz="6600" b="1" dirty="0" smtClean="0"/>
-              <a:t>Domains</a:t>
+              <a:t>Sub-Domains</a:t>
             </a:r>
             <a:endParaRPr lang="en-GB" sz="6600" b="1" dirty="0"/>
           </a:p>
@@ -5614,8 +5725,8 @@
         </p:nvSpPr>
         <p:spPr>
           <a:xfrm>
-            <a:off x="1" y="2297367"/>
-            <a:ext cx="9143999" cy="2123658"/>
+            <a:off x="1" y="1739602"/>
+            <a:ext cx="9143999" cy="4154983"/>
           </a:xfrm>
           <a:prstGeom prst="rect">
             <a:avLst/>
@@ -5630,8 +5741,22 @@
           <a:p>
             <a:pPr algn="ctr"/>
             <a:r>
+              <a:rPr lang="en-GB" sz="4400" b="1" dirty="0" smtClean="0"/>
+              <a:t>2013</a:t>
+            </a:r>
+          </a:p>
+          <a:p>
+            <a:pPr algn="ctr"/>
+            <a:r>
               <a:rPr lang="en-GB" sz="4400" dirty="0" smtClean="0"/>
-              <a:t>@2013 :: Earth System Models</a:t>
+              <a:t>Earth System Models</a:t>
+            </a:r>
+          </a:p>
+          <a:p>
+            <a:pPr algn="ctr"/>
+            <a:r>
+              <a:rPr lang="en-GB" sz="4400" dirty="0" smtClean="0"/>
+              <a:t>Statistical Downscaling</a:t>
             </a:r>
           </a:p>
           <a:p>
@@ -5641,16 +5766,15 @@
           <a:p>
             <a:pPr algn="ctr"/>
             <a:r>
+              <a:rPr lang="en-GB" sz="4400" b="1" dirty="0" smtClean="0"/>
+              <a:t>2014</a:t>
+            </a:r>
+          </a:p>
+          <a:p>
+            <a:pPr algn="ctr"/>
+            <a:r>
               <a:rPr lang="en-GB" sz="4400" dirty="0" smtClean="0"/>
-              <a:t>@2014 ? :</a:t>
-            </a:r>
-            <a:r>
-              <a:rPr lang="en-GB" sz="4400" dirty="0"/>
-              <a:t>: Earth System </a:t>
-            </a:r>
-            <a:r>
-              <a:rPr lang="en-GB" sz="4400" dirty="0" smtClean="0"/>
-              <a:t>Observations</a:t>
+              <a:t>Obs4MIPs ?</a:t>
             </a:r>
           </a:p>
         </p:txBody>
@@ -5658,7 +5782,7 @@
     </p:spTree>
     <p:extLst>
       <p:ext uri="{BB962C8B-B14F-4D97-AF65-F5344CB8AC3E}">
-        <p14:creationId xmlns:p14="http://schemas.microsoft.com/office/powerpoint/2010/main" val="978404151"/>
+        <p14:creationId xmlns:p14="http://schemas.microsoft.com/office/powerpoint/2010/main" val="3371203601"/>
       </p:ext>
     </p:extLst>
   </p:cSld>

</xml_diff>